<commit_message>
fix: address review findings in whiteboard docs
- Fix invalid SQL: SAFE_DIVIDE now uses inline expressions instead of
  referencing SELECT aliases (BigQuery disallows same-level alias refs)
- Soften absolute claims: "zero code changes" → "no business-logic
  changes", "no duplicate writes, no data loss" → "minimizes duplication
  and data loss risk"
- Regenerate PPTX with updated slide text

Co-Authored-By: Claude Opus 4.6 <noreply@anthropic.com>
</commit_message>
<xml_diff>
--- a/docs/ucp_analytics_whiteboard.pptx
+++ b/docs/ucp_analytics_whiteboard.pptx
@@ -4200,11 +4200,11 @@
         <p:spPr>
           <a:xfrm>
             <a:off x="507950" y="1057126"/>
-            <a:ext cx="8128099" cy="453926"/>
+            <a:ext cx="8128099" cy="653951"/>
           </a:xfrm>
           <a:prstGeom prst="roundRect">
             <a:avLst>
-              <a:gd name="adj" fmla="val 16787"/>
+              <a:gd name="adj" fmla="val 11652"/>
             </a:avLst>
           </a:prstGeom>
           <a:solidFill>
@@ -4232,7 +4232,7 @@
         <p:spPr>
           <a:xfrm>
             <a:off x="531763" y="1057126"/>
-            <a:ext cx="0" cy="453926"/>
+            <a:ext cx="0" cy="653951"/>
           </a:xfrm>
           <a:prstGeom prst="line">
             <a:avLst/>
@@ -4255,7 +4255,7 @@
         <p:spPr>
           <a:xfrm>
             <a:off x="809476" y="1184077"/>
-            <a:ext cx="7724126" cy="200025"/>
+            <a:ext cx="7724126" cy="400050"/>
           </a:xfrm>
           <a:prstGeom prst="rect">
             <a:avLst/>
@@ -4293,7 +4293,7 @@
                 <a:ea typeface="Arial" pitchFamily="34" charset="-122"/>
                 <a:cs typeface="Arial" pitchFamily="34" charset="-120"/>
               </a:rPr>
-              <a:t>zero code changes</a:t>
+              <a:t>no business-logic changes</a:t>
             </a:r>
             <a:pPr algn="l" indent="0" marL="0">
               <a:buNone/>
@@ -4321,7 +4321,7 @@
         </p:nvSpPr>
         <p:spPr>
           <a:xfrm>
-            <a:off x="507950" y="1790402"/>
+            <a:off x="507950" y="1990427"/>
             <a:ext cx="2540198" cy="1688009"/>
           </a:xfrm>
           <a:prstGeom prst="roundRect">
@@ -4353,7 +4353,7 @@
         </p:nvSpPr>
         <p:spPr>
           <a:xfrm>
-            <a:off x="507950" y="1809452"/>
+            <a:off x="507950" y="2009477"/>
             <a:ext cx="2540198" cy="0"/>
           </a:xfrm>
           <a:prstGeom prst="line">
@@ -4376,7 +4376,7 @@
         </p:nvSpPr>
         <p:spPr>
           <a:xfrm>
-            <a:off x="711101" y="2031653"/>
+            <a:off x="711101" y="2231678"/>
             <a:ext cx="2176576" cy="200025"/>
           </a:xfrm>
           <a:prstGeom prst="rect">
@@ -4418,7 +4418,7 @@
         </p:nvSpPr>
         <p:spPr>
           <a:xfrm>
-            <a:off x="711101" y="2307878"/>
+            <a:off x="711101" y="2507903"/>
             <a:ext cx="2176576" cy="586680"/>
           </a:xfrm>
           <a:prstGeom prst="rect">
@@ -4463,7 +4463,7 @@
         </p:nvSpPr>
         <p:spPr>
           <a:xfrm>
-            <a:off x="711101" y="2996059"/>
+            <a:off x="711101" y="3196084"/>
             <a:ext cx="1523851" cy="279202"/>
           </a:xfrm>
           <a:prstGeom prst="roundRect">
@@ -4495,7 +4495,7 @@
         </p:nvSpPr>
         <p:spPr>
           <a:xfrm>
-            <a:off x="825352" y="3046809"/>
+            <a:off x="825352" y="3246834"/>
             <a:ext cx="1295349" cy="177701"/>
           </a:xfrm>
           <a:prstGeom prst="rect">
@@ -4537,7 +4537,7 @@
         </p:nvSpPr>
         <p:spPr>
           <a:xfrm>
-            <a:off x="3302050" y="1790402"/>
+            <a:off x="3302050" y="1990427"/>
             <a:ext cx="2540050" cy="1688009"/>
           </a:xfrm>
           <a:prstGeom prst="roundRect">
@@ -4569,7 +4569,7 @@
         </p:nvSpPr>
         <p:spPr>
           <a:xfrm>
-            <a:off x="3302050" y="1809452"/>
+            <a:off x="3302050" y="2009477"/>
             <a:ext cx="2540050" cy="0"/>
           </a:xfrm>
           <a:prstGeom prst="line">
@@ -4592,7 +4592,7 @@
         </p:nvSpPr>
         <p:spPr>
           <a:xfrm>
-            <a:off x="3505200" y="2031653"/>
+            <a:off x="3505200" y="2231678"/>
             <a:ext cx="2176424" cy="200025"/>
           </a:xfrm>
           <a:prstGeom prst="rect">
@@ -4634,7 +4634,7 @@
         </p:nvSpPr>
         <p:spPr>
           <a:xfrm>
-            <a:off x="3505200" y="2307878"/>
+            <a:off x="3505200" y="2507903"/>
             <a:ext cx="2176424" cy="586680"/>
           </a:xfrm>
           <a:prstGeom prst="rect">
@@ -4679,7 +4679,7 @@
         </p:nvSpPr>
         <p:spPr>
           <a:xfrm>
-            <a:off x="3505200" y="2996059"/>
+            <a:off x="3505200" y="3196084"/>
             <a:ext cx="1523851" cy="279202"/>
           </a:xfrm>
           <a:prstGeom prst="roundRect">
@@ -4711,7 +4711,7 @@
         </p:nvSpPr>
         <p:spPr>
           <a:xfrm>
-            <a:off x="3619451" y="3046809"/>
+            <a:off x="3619451" y="3246834"/>
             <a:ext cx="1295349" cy="177701"/>
           </a:xfrm>
           <a:prstGeom prst="rect">
@@ -4753,7 +4753,7 @@
         </p:nvSpPr>
         <p:spPr>
           <a:xfrm>
-            <a:off x="6096000" y="1790402"/>
+            <a:off x="6096000" y="1990427"/>
             <a:ext cx="2540050" cy="1688009"/>
           </a:xfrm>
           <a:prstGeom prst="roundRect">
@@ -4785,7 +4785,7 @@
         </p:nvSpPr>
         <p:spPr>
           <a:xfrm>
-            <a:off x="6096000" y="1809452"/>
+            <a:off x="6096000" y="2009477"/>
             <a:ext cx="2540050" cy="0"/>
           </a:xfrm>
           <a:prstGeom prst="line">
@@ -4808,7 +4808,7 @@
         </p:nvSpPr>
         <p:spPr>
           <a:xfrm>
-            <a:off x="6299150" y="2031653"/>
+            <a:off x="6299150" y="2231678"/>
             <a:ext cx="2176424" cy="200025"/>
           </a:xfrm>
           <a:prstGeom prst="rect">
@@ -4850,7 +4850,7 @@
         </p:nvSpPr>
         <p:spPr>
           <a:xfrm>
-            <a:off x="6299150" y="2307878"/>
+            <a:off x="6299150" y="2507903"/>
             <a:ext cx="2176424" cy="586680"/>
           </a:xfrm>
           <a:prstGeom prst="rect">
@@ -4895,7 +4895,7 @@
         </p:nvSpPr>
         <p:spPr>
           <a:xfrm>
-            <a:off x="6299150" y="2996059"/>
+            <a:off x="6299150" y="3196084"/>
             <a:ext cx="1523851" cy="279202"/>
           </a:xfrm>
           <a:prstGeom prst="roundRect">
@@ -4927,7 +4927,7 @@
         </p:nvSpPr>
         <p:spPr>
           <a:xfrm>
-            <a:off x="6413401" y="3046809"/>
+            <a:off x="6413401" y="3246834"/>
             <a:ext cx="1295349" cy="177701"/>
           </a:xfrm>
           <a:prstGeom prst="rect">
@@ -4969,7 +4969,7 @@
         </p:nvSpPr>
         <p:spPr>
           <a:xfrm>
-            <a:off x="507950" y="3757761"/>
+            <a:off x="507950" y="3957786"/>
             <a:ext cx="8128099" cy="453926"/>
           </a:xfrm>
           <a:prstGeom prst="roundRect">
@@ -5001,7 +5001,7 @@
         </p:nvSpPr>
         <p:spPr>
           <a:xfrm>
-            <a:off x="685648" y="3884712"/>
+            <a:off x="685648" y="4084737"/>
             <a:ext cx="7772704" cy="200025"/>
           </a:xfrm>
           <a:prstGeom prst="rect">
@@ -8447,7 +8447,7 @@
                 <a:ea typeface="Arial" pitchFamily="34" charset="-122"/>
                 <a:cs typeface="Arial" pitchFamily="34" charset="-120"/>
               </a:rPr>
-              <a:t>Requeue only failed rows</a:t>
+              <a:t>Retries failed rows</a:t>
             </a:r>
             <a:pPr algn="l" indent="0" marL="0">
               <a:buNone/>
@@ -8461,7 +8461,7 @@
                 <a:ea typeface="Arial" pitchFamily="34" charset="-122"/>
                 <a:cs typeface="Arial" pitchFamily="34" charset="-120"/>
               </a:rPr>
-              <a:t> — no duplicate writes, no data loss</a:t>
+              <a:t> — minimizes duplication and data loss risk</a:t>
             </a:r>
             <a:endParaRPr lang="en-US" sz="1100" dirty="0"/>
           </a:p>

</xml_diff>